<commit_message>
Updating with more samples
</commit_message>
<xml_diff>
--- a/SDC2013.pptx
+++ b/SDC2013.pptx
@@ -5,7 +5,7 @@
     <p:sldMasterId id="2147483648" r:id="rId1"/>
   </p:sldMasterIdLst>
   <p:notesMasterIdLst>
-    <p:notesMasterId r:id="rId36"/>
+    <p:notesMasterId r:id="rId35"/>
   </p:notesMasterIdLst>
   <p:sldIdLst>
     <p:sldId id="256" r:id="rId2"/>
@@ -32,16 +32,15 @@
     <p:sldId id="287" r:id="rId23"/>
     <p:sldId id="272" r:id="rId24"/>
     <p:sldId id="294" r:id="rId25"/>
-    <p:sldId id="295" r:id="rId26"/>
-    <p:sldId id="296" r:id="rId27"/>
-    <p:sldId id="273" r:id="rId28"/>
-    <p:sldId id="285" r:id="rId29"/>
-    <p:sldId id="288" r:id="rId30"/>
-    <p:sldId id="292" r:id="rId31"/>
-    <p:sldId id="283" r:id="rId32"/>
-    <p:sldId id="260" r:id="rId33"/>
-    <p:sldId id="300" r:id="rId34"/>
-    <p:sldId id="289" r:id="rId35"/>
+    <p:sldId id="296" r:id="rId26"/>
+    <p:sldId id="273" r:id="rId27"/>
+    <p:sldId id="285" r:id="rId28"/>
+    <p:sldId id="288" r:id="rId29"/>
+    <p:sldId id="292" r:id="rId30"/>
+    <p:sldId id="283" r:id="rId31"/>
+    <p:sldId id="260" r:id="rId32"/>
+    <p:sldId id="300" r:id="rId33"/>
+    <p:sldId id="289" r:id="rId34"/>
   </p:sldIdLst>
   <p:sldSz cx="9144000" cy="6858000" type="screen4x3"/>
   <p:notesSz cx="6858000" cy="9144000"/>
@@ -988,7 +987,7 @@
             <a:fld id="{7BC0C7B8-101C-4F8C-9143-43222D1AB2E2}" type="slidenum">
               <a:rPr lang="en-US" smtClean="0"/>
               <a:pPr/>
-              <a:t>27</a:t>
+              <a:t>26</a:t>
             </a:fld>
             <a:endParaRPr lang="en-US"/>
           </a:p>
@@ -1079,7 +1078,7 @@
             <a:fld id="{7BC0C7B8-101C-4F8C-9143-43222D1AB2E2}" type="slidenum">
               <a:rPr lang="en-US" smtClean="0"/>
               <a:pPr/>
-              <a:t>29</a:t>
+              <a:t>28</a:t>
             </a:fld>
             <a:endParaRPr lang="en-US"/>
           </a:p>
@@ -1251,7 +1250,7 @@
             <a:fld id="{7BC0C7B8-101C-4F8C-9143-43222D1AB2E2}" type="slidenum">
               <a:rPr lang="en-US" smtClean="0"/>
               <a:pPr/>
-              <a:t>31</a:t>
+              <a:t>30</a:t>
             </a:fld>
             <a:endParaRPr lang="en-US"/>
           </a:p>
@@ -1412,7 +1411,7 @@
             <a:fld id="{7BC0C7B8-101C-4F8C-9143-43222D1AB2E2}" type="slidenum">
               <a:rPr lang="en-US" smtClean="0"/>
               <a:pPr/>
-              <a:t>33</a:t>
+              <a:t>32</a:t>
             </a:fld>
             <a:endParaRPr lang="en-US"/>
           </a:p>
@@ -5850,7 +5849,7 @@
                 </a:solidFill>
                 <a:latin typeface="Proxima Nova Rg" panose="02000506030000020004" pitchFamily="2" charset="0"/>
               </a:rPr>
-              <a:t>Why?</a:t>
+              <a:t>Why Use Streams?</a:t>
             </a:r>
             <a:endParaRPr lang="en-US" dirty="0">
               <a:solidFill>
@@ -8087,7 +8086,7 @@
                 </a:solidFill>
                 <a:latin typeface="Proxima Nova Rg" panose="02000506030000020004" pitchFamily="2" charset="0"/>
               </a:rPr>
-              <a:t>Streams</a:t>
+              <a:t>The Stream Class</a:t>
             </a:r>
             <a:endParaRPr lang="en-US" dirty="0">
               <a:solidFill>
@@ -8142,9 +8141,9 @@
                   <a:schemeClr val="bg1"/>
                 </a:solidFill>
               </a:rPr>
-              <a:t>Compose with pipe</a:t>
-            </a:r>
-            <a:endParaRPr lang="en-US" dirty="0">
+              <a:t>Composition through pipe method</a:t>
+            </a:r>
+            <a:endParaRPr lang="en-US" dirty="0" smtClean="0">
               <a:solidFill>
                 <a:schemeClr val="bg1"/>
               </a:solidFill>
@@ -8751,10 +8750,8 @@
                 </a:solidFill>
                 <a:latin typeface="Proxima Nova Rg" panose="02000506030000020004" pitchFamily="50" charset="0"/>
               </a:rPr>
-              <a:t>Emit data and end events</a:t>
-            </a:r>
-          </a:p>
-          <a:p>
+              <a:t>Emit </a:t>
+            </a:r>
             <a:r>
               <a:rPr lang="en-US" dirty="0" smtClean="0">
                 <a:solidFill>
@@ -8762,9 +8759,27 @@
                 </a:solidFill>
                 <a:latin typeface="Proxima Nova Rg" panose="02000506030000020004" pitchFamily="50" charset="0"/>
               </a:rPr>
-              <a:t>Pause? Drain?</a:t>
-            </a:r>
-            <a:endParaRPr lang="en-US" dirty="0">
+              <a:t>many data events </a:t>
+            </a:r>
+            <a:r>
+              <a:rPr lang="en-US" dirty="0" smtClean="0">
+                <a:solidFill>
+                  <a:schemeClr val="bg1"/>
+                </a:solidFill>
+                <a:latin typeface="Proxima Nova Rg" panose="02000506030000020004" pitchFamily="50" charset="0"/>
+              </a:rPr>
+              <a:t>and </a:t>
+            </a:r>
+            <a:r>
+              <a:rPr lang="en-US" dirty="0" smtClean="0">
+                <a:solidFill>
+                  <a:schemeClr val="bg1"/>
+                </a:solidFill>
+                <a:latin typeface="Proxima Nova Rg" panose="02000506030000020004" pitchFamily="50" charset="0"/>
+              </a:rPr>
+              <a:t>a single end event</a:t>
+            </a:r>
+            <a:endParaRPr lang="en-US" dirty="0" smtClean="0">
               <a:solidFill>
                 <a:schemeClr val="bg1"/>
               </a:solidFill>
@@ -9405,10 +9420,8 @@
                 </a:solidFill>
                 <a:latin typeface="Proxima Nova Rg" panose="02000506030000020004" pitchFamily="50" charset="0"/>
               </a:rPr>
-              <a:t>Set writable to true</a:t>
-            </a:r>
-          </a:p>
-          <a:p>
+              <a:t>Implement </a:t>
+            </a:r>
             <a:r>
               <a:rPr lang="en-US" dirty="0" smtClean="0">
                 <a:solidFill>
@@ -9416,7 +9429,7 @@
                 </a:solidFill>
                 <a:latin typeface="Proxima Nova Rg" panose="02000506030000020004" pitchFamily="50" charset="0"/>
               </a:rPr>
-              <a:t>Implement write, end and destroy methods</a:t>
+              <a:t>write, end and destroy methods</a:t>
             </a:r>
             <a:endParaRPr lang="en-US" dirty="0">
               <a:solidFill>
@@ -9436,7 +9449,7 @@
         <p:spPr>
           <a:xfrm>
             <a:off x="457200" y="2887682"/>
-            <a:ext cx="8229600" cy="3416320"/>
+            <a:ext cx="8229600" cy="3785652"/>
           </a:xfrm>
           <a:prstGeom prst="rect">
             <a:avLst/>
@@ -9450,7 +9463,7 @@
           <a:lstStyle/>
           <a:p>
             <a:r>
-              <a:rPr lang="en-US" b="1" dirty="0" err="1" smtClean="0">
+              <a:rPr lang="en-US" sz="2000" b="1" dirty="0" err="1" smtClean="0">
                 <a:solidFill>
                   <a:schemeClr val="bg1"/>
                 </a:solidFill>
@@ -9460,7 +9473,7 @@
               <a:t>stream.writable</a:t>
             </a:r>
             <a:r>
-              <a:rPr lang="en-US" b="1" dirty="0" smtClean="0">
+              <a:rPr lang="en-US" sz="2000" b="1" dirty="0" smtClean="0">
                 <a:solidFill>
                   <a:schemeClr val="bg1"/>
                 </a:solidFill>
@@ -9470,7 +9483,7 @@
               <a:t> </a:t>
             </a:r>
             <a:r>
-              <a:rPr lang="en-US" b="1" dirty="0">
+              <a:rPr lang="en-US" sz="2000" b="1" dirty="0">
                 <a:solidFill>
                   <a:schemeClr val="bg1"/>
                 </a:solidFill>
@@ -9480,7 +9493,7 @@
               <a:t>= </a:t>
             </a:r>
             <a:r>
-              <a:rPr lang="en-US" b="1" dirty="0">
+              <a:rPr lang="en-US" sz="2000" b="1" dirty="0">
                 <a:solidFill>
                   <a:srgbClr val="AE81FF"/>
                 </a:solidFill>
@@ -9490,7 +9503,7 @@
               <a:t>true</a:t>
             </a:r>
             <a:r>
-              <a:rPr lang="en-US" b="1" dirty="0">
+              <a:rPr lang="en-US" sz="2000" b="1" dirty="0">
                 <a:solidFill>
                   <a:schemeClr val="bg1"/>
                 </a:solidFill>
@@ -9501,7 +9514,7 @@
             </a:r>
           </a:p>
           <a:p>
-            <a:endParaRPr lang="en-US" b="1" dirty="0">
+            <a:endParaRPr lang="en-US" sz="2000" b="1" dirty="0">
               <a:solidFill>
                 <a:schemeClr val="bg1"/>
               </a:solidFill>
@@ -9511,7 +9524,7 @@
           </a:p>
           <a:p>
             <a:r>
-              <a:rPr lang="en-US" b="1" dirty="0" err="1">
+              <a:rPr lang="en-US" sz="2000" b="1" dirty="0" err="1">
                 <a:solidFill>
                   <a:srgbClr val="66D9EF"/>
                 </a:solidFill>
@@ -9521,7 +9534,7 @@
               <a:t>s</a:t>
             </a:r>
             <a:r>
-              <a:rPr lang="en-US" b="1" dirty="0" err="1">
+              <a:rPr lang="en-US" sz="2000" b="1" dirty="0" err="1">
                 <a:solidFill>
                   <a:schemeClr val="bg1"/>
                 </a:solidFill>
@@ -9531,7 +9544,7 @@
               <a:t>.</a:t>
             </a:r>
             <a:r>
-              <a:rPr lang="en-US" b="1" dirty="0" err="1">
+              <a:rPr lang="en-US" sz="2000" b="1" dirty="0" err="1">
                 <a:solidFill>
                   <a:srgbClr val="A6E22E"/>
                 </a:solidFill>
@@ -9541,7 +9554,7 @@
               <a:t>write</a:t>
             </a:r>
             <a:r>
-              <a:rPr lang="en-US" b="1" dirty="0">
+              <a:rPr lang="en-US" sz="2000" b="1" dirty="0">
                 <a:solidFill>
                   <a:schemeClr val="bg1"/>
                 </a:solidFill>
@@ -9551,7 +9564,7 @@
               <a:t> = </a:t>
             </a:r>
             <a:r>
-              <a:rPr lang="en-US" b="1" dirty="0">
+              <a:rPr lang="en-US" sz="2000" b="1" dirty="0">
                 <a:solidFill>
                   <a:srgbClr val="66D9EF"/>
                 </a:solidFill>
@@ -9561,7 +9574,7 @@
               <a:t>function</a:t>
             </a:r>
             <a:r>
-              <a:rPr lang="en-US" b="1" dirty="0">
+              <a:rPr lang="en-US" sz="2000" b="1" dirty="0">
                 <a:solidFill>
                   <a:schemeClr val="bg1"/>
                 </a:solidFill>
@@ -9571,7 +9584,7 @@
               <a:t> (</a:t>
             </a:r>
             <a:r>
-              <a:rPr lang="en-US" b="1" dirty="0">
+              <a:rPr lang="en-US" sz="2000" b="1" dirty="0">
                 <a:solidFill>
                   <a:srgbClr val="FD971F"/>
                 </a:solidFill>
@@ -9581,7 +9594,7 @@
               <a:t>data</a:t>
             </a:r>
             <a:r>
-              <a:rPr lang="en-US" b="1" dirty="0">
+              <a:rPr lang="en-US" sz="2000" b="1" dirty="0">
                 <a:solidFill>
                   <a:schemeClr val="bg1"/>
                 </a:solidFill>
@@ -9591,7 +9604,7 @@
               <a:t>) </a:t>
             </a:r>
             <a:r>
-              <a:rPr lang="en-US" b="1" dirty="0" smtClean="0">
+              <a:rPr lang="en-US" sz="2000" b="1" dirty="0" smtClean="0">
                 <a:solidFill>
                   <a:schemeClr val="bg1"/>
                 </a:solidFill>
@@ -9600,7 +9613,7 @@
               </a:rPr>
               <a:t>{ ... };</a:t>
             </a:r>
-            <a:endParaRPr lang="en-US" b="1" dirty="0">
+            <a:endParaRPr lang="en-US" sz="2000" b="1" dirty="0">
               <a:solidFill>
                 <a:schemeClr val="bg1"/>
               </a:solidFill>
@@ -9609,7 +9622,7 @@
             </a:endParaRPr>
           </a:p>
           <a:p>
-            <a:endParaRPr lang="en-US" b="1" dirty="0">
+            <a:endParaRPr lang="en-US" sz="2000" b="1" dirty="0">
               <a:solidFill>
                 <a:schemeClr val="bg1"/>
               </a:solidFill>
@@ -9619,7 +9632,7 @@
           </a:p>
           <a:p>
             <a:r>
-              <a:rPr lang="en-US" b="1" dirty="0" err="1">
+              <a:rPr lang="en-US" sz="2000" b="1" dirty="0" err="1">
                 <a:solidFill>
                   <a:srgbClr val="66D9EF"/>
                 </a:solidFill>
@@ -9629,7 +9642,7 @@
               <a:t>s</a:t>
             </a:r>
             <a:r>
-              <a:rPr lang="en-US" b="1" dirty="0" err="1">
+              <a:rPr lang="en-US" sz="2000" b="1" dirty="0" err="1">
                 <a:solidFill>
                   <a:schemeClr val="bg1"/>
                 </a:solidFill>
@@ -9639,7 +9652,7 @@
               <a:t>.</a:t>
             </a:r>
             <a:r>
-              <a:rPr lang="en-US" b="1" dirty="0" err="1">
+              <a:rPr lang="en-US" sz="2000" b="1" dirty="0" err="1">
                 <a:solidFill>
                   <a:srgbClr val="A6E22E"/>
                 </a:solidFill>
@@ -9649,7 +9662,7 @@
               <a:t>end</a:t>
             </a:r>
             <a:r>
-              <a:rPr lang="en-US" b="1" dirty="0">
+              <a:rPr lang="en-US" sz="2000" b="1" dirty="0">
                 <a:solidFill>
                   <a:schemeClr val="bg1"/>
                 </a:solidFill>
@@ -9659,7 +9672,7 @@
               <a:t> = </a:t>
             </a:r>
             <a:r>
-              <a:rPr lang="en-US" b="1" dirty="0">
+              <a:rPr lang="en-US" sz="2000" b="1" dirty="0">
                 <a:solidFill>
                   <a:srgbClr val="66D9EF"/>
                 </a:solidFill>
@@ -9669,7 +9682,7 @@
               <a:t>function</a:t>
             </a:r>
             <a:r>
-              <a:rPr lang="en-US" b="1" dirty="0">
+              <a:rPr lang="en-US" sz="2000" b="1" dirty="0">
                 <a:solidFill>
                   <a:schemeClr val="bg1"/>
                 </a:solidFill>
@@ -9679,7 +9692,7 @@
               <a:t> (</a:t>
             </a:r>
             <a:r>
-              <a:rPr lang="en-US" b="1" dirty="0">
+              <a:rPr lang="en-US" sz="2000" b="1" dirty="0">
                 <a:solidFill>
                   <a:srgbClr val="FD971F"/>
                 </a:solidFill>
@@ -9689,7 +9702,7 @@
               <a:t>data</a:t>
             </a:r>
             <a:r>
-              <a:rPr lang="en-US" b="1" dirty="0">
+              <a:rPr lang="en-US" sz="2000" b="1" dirty="0">
                 <a:solidFill>
                   <a:schemeClr val="bg1"/>
                 </a:solidFill>
@@ -9701,7 +9714,7 @@
           </a:p>
           <a:p>
             <a:r>
-              <a:rPr lang="en-US" b="1" dirty="0" smtClean="0">
+              <a:rPr lang="en-US" sz="2000" b="1" dirty="0" smtClean="0">
                 <a:solidFill>
                   <a:schemeClr val="bg1"/>
                 </a:solidFill>
@@ -9711,7 +9724,7 @@
               <a:t>    </a:t>
             </a:r>
             <a:r>
-              <a:rPr lang="en-US" b="1" dirty="0" smtClean="0">
+              <a:rPr lang="en-US" sz="2000" b="1" dirty="0" smtClean="0">
                 <a:solidFill>
                   <a:srgbClr val="F92672"/>
                 </a:solidFill>
@@ -9721,7 +9734,7 @@
               <a:t>if</a:t>
             </a:r>
             <a:r>
-              <a:rPr lang="en-US" b="1" dirty="0" smtClean="0">
+              <a:rPr lang="en-US" sz="2000" b="1" dirty="0" smtClean="0">
                 <a:solidFill>
                   <a:schemeClr val="bg1"/>
                 </a:solidFill>
@@ -9731,7 +9744,7 @@
               <a:t> (</a:t>
             </a:r>
             <a:r>
-              <a:rPr lang="en-US" b="1" dirty="0" err="1" smtClean="0">
+              <a:rPr lang="en-US" sz="2000" b="1" dirty="0" err="1" smtClean="0">
                 <a:solidFill>
                   <a:schemeClr val="bg1"/>
                 </a:solidFill>
@@ -9741,7 +9754,7 @@
               <a:t>arguments.length</a:t>
             </a:r>
             <a:r>
-              <a:rPr lang="en-US" b="1" dirty="0" smtClean="0">
+              <a:rPr lang="en-US" sz="2000" b="1" dirty="0" smtClean="0">
                 <a:solidFill>
                   <a:schemeClr val="bg1"/>
                 </a:solidFill>
@@ -9751,7 +9764,7 @@
               <a:t>) </a:t>
             </a:r>
             <a:r>
-              <a:rPr lang="en-US" b="1" dirty="0" err="1" smtClean="0">
+              <a:rPr lang="en-US" sz="2000" b="1" dirty="0" err="1" smtClean="0">
                 <a:solidFill>
                   <a:schemeClr val="bg1"/>
                 </a:solidFill>
@@ -9761,7 +9774,7 @@
               <a:t>s.write</a:t>
             </a:r>
             <a:r>
-              <a:rPr lang="en-US" b="1" dirty="0" smtClean="0">
+              <a:rPr lang="en-US" sz="2000" b="1" dirty="0" smtClean="0">
                 <a:solidFill>
                   <a:schemeClr val="bg1"/>
                 </a:solidFill>
@@ -9773,7 +9786,7 @@
           </a:p>
           <a:p>
             <a:r>
-              <a:rPr lang="en-US" b="1" dirty="0">
+              <a:rPr lang="en-US" sz="2000" b="1" dirty="0">
                 <a:solidFill>
                   <a:schemeClr val="bg1"/>
                 </a:solidFill>
@@ -9783,7 +9796,7 @@
               <a:t> </a:t>
             </a:r>
             <a:r>
-              <a:rPr lang="en-US" b="1" dirty="0" smtClean="0">
+              <a:rPr lang="en-US" sz="2000" b="1" dirty="0" smtClean="0">
                 <a:solidFill>
                   <a:schemeClr val="bg1"/>
                 </a:solidFill>
@@ -9793,7 +9806,7 @@
               <a:t>   </a:t>
             </a:r>
             <a:r>
-              <a:rPr lang="en-US" b="1" dirty="0" err="1" smtClean="0">
+              <a:rPr lang="en-US" sz="2000" b="1" dirty="0" err="1" smtClean="0">
                 <a:solidFill>
                   <a:schemeClr val="bg1"/>
                 </a:solidFill>
@@ -9803,7 +9816,7 @@
               <a:t>this.destroy</a:t>
             </a:r>
             <a:r>
-              <a:rPr lang="en-US" b="1" dirty="0" smtClean="0">
+              <a:rPr lang="en-US" sz="2000" b="1" dirty="0" smtClean="0">
                 <a:solidFill>
                   <a:schemeClr val="bg1"/>
                 </a:solidFill>
@@ -9812,7 +9825,7 @@
               </a:rPr>
               <a:t>();</a:t>
             </a:r>
-            <a:endParaRPr lang="en-US" b="1" dirty="0">
+            <a:endParaRPr lang="en-US" sz="2000" b="1" dirty="0">
               <a:solidFill>
                 <a:schemeClr val="bg1"/>
               </a:solidFill>
@@ -9822,7 +9835,7 @@
           </a:p>
           <a:p>
             <a:r>
-              <a:rPr lang="en-US" b="1" dirty="0">
+              <a:rPr lang="en-US" sz="2000" b="1" dirty="0">
                 <a:solidFill>
                   <a:schemeClr val="bg1"/>
                 </a:solidFill>
@@ -9833,7 +9846,7 @@
             </a:r>
           </a:p>
           <a:p>
-            <a:endParaRPr lang="en-US" b="1" dirty="0">
+            <a:endParaRPr lang="en-US" sz="2000" b="1" dirty="0">
               <a:solidFill>
                 <a:schemeClr val="bg1"/>
               </a:solidFill>
@@ -9843,7 +9856,7 @@
           </a:p>
           <a:p>
             <a:r>
-              <a:rPr lang="en-US" b="1" dirty="0" err="1">
+              <a:rPr lang="en-US" sz="2000" b="1" dirty="0" err="1">
                 <a:solidFill>
                   <a:srgbClr val="66D9EF"/>
                 </a:solidFill>
@@ -9853,7 +9866,7 @@
               <a:t>s</a:t>
             </a:r>
             <a:r>
-              <a:rPr lang="en-US" b="1" dirty="0" err="1">
+              <a:rPr lang="en-US" sz="2000" b="1" dirty="0" err="1">
                 <a:solidFill>
                   <a:schemeClr val="bg1"/>
                 </a:solidFill>
@@ -9863,7 +9876,7 @@
               <a:t>.</a:t>
             </a:r>
             <a:r>
-              <a:rPr lang="en-US" b="1" dirty="0" err="1">
+              <a:rPr lang="en-US" sz="2000" b="1" dirty="0" err="1">
                 <a:solidFill>
                   <a:srgbClr val="A6E22E"/>
                 </a:solidFill>
@@ -9873,7 +9886,7 @@
               <a:t>destroy</a:t>
             </a:r>
             <a:r>
-              <a:rPr lang="en-US" b="1" dirty="0">
+              <a:rPr lang="en-US" sz="2000" b="1" dirty="0">
                 <a:solidFill>
                   <a:schemeClr val="bg1"/>
                 </a:solidFill>
@@ -9883,7 +9896,7 @@
               <a:t> = </a:t>
             </a:r>
             <a:r>
-              <a:rPr lang="en-US" b="1" dirty="0">
+              <a:rPr lang="en-US" sz="2000" b="1" dirty="0">
                 <a:solidFill>
                   <a:srgbClr val="66D9EF"/>
                 </a:solidFill>
@@ -9893,7 +9906,7 @@
               <a:t>function</a:t>
             </a:r>
             <a:r>
-              <a:rPr lang="en-US" b="1" dirty="0">
+              <a:rPr lang="en-US" sz="2000" b="1" dirty="0">
                 <a:solidFill>
                   <a:schemeClr val="bg1"/>
                 </a:solidFill>
@@ -9905,7 +9918,7 @@
           </a:p>
           <a:p>
             <a:r>
-              <a:rPr lang="en-US" b="1" dirty="0">
+              <a:rPr lang="en-US" sz="2000" b="1" dirty="0">
                 <a:solidFill>
                   <a:schemeClr val="bg1"/>
                 </a:solidFill>
@@ -9915,7 +9928,7 @@
               <a:t>    </a:t>
             </a:r>
             <a:r>
-              <a:rPr lang="en-US" b="1" dirty="0" err="1">
+              <a:rPr lang="en-US" sz="2000" b="1" dirty="0" err="1">
                 <a:solidFill>
                   <a:schemeClr val="bg1"/>
                 </a:solidFill>
@@ -9925,7 +9938,7 @@
               <a:t>this.writable</a:t>
             </a:r>
             <a:r>
-              <a:rPr lang="en-US" b="1" dirty="0">
+              <a:rPr lang="en-US" sz="2000" b="1" dirty="0">
                 <a:solidFill>
                   <a:schemeClr val="bg1"/>
                 </a:solidFill>
@@ -9935,7 +9948,7 @@
               <a:t> = </a:t>
             </a:r>
             <a:r>
-              <a:rPr lang="en-US" b="1" dirty="0">
+              <a:rPr lang="en-US" sz="2000" b="1" dirty="0">
                 <a:solidFill>
                   <a:srgbClr val="AE81FF"/>
                 </a:solidFill>
@@ -9945,7 +9958,7 @@
               <a:t>false</a:t>
             </a:r>
             <a:r>
-              <a:rPr lang="en-US" b="1" dirty="0">
+              <a:rPr lang="en-US" sz="2000" b="1" dirty="0">
                 <a:solidFill>
                   <a:schemeClr val="bg1"/>
                 </a:solidFill>
@@ -9957,7 +9970,7 @@
           </a:p>
           <a:p>
             <a:r>
-              <a:rPr lang="en-US" b="1" dirty="0">
+              <a:rPr lang="en-US" sz="2000" b="1" dirty="0">
                 <a:solidFill>
                   <a:schemeClr val="bg1"/>
                 </a:solidFill>
@@ -10997,7 +11010,7 @@
         <p:spPr>
           <a:xfrm>
             <a:off x="609600" y="4267200"/>
-            <a:ext cx="7924800" cy="553998"/>
+            <a:ext cx="7924800" cy="461665"/>
           </a:xfrm>
           <a:prstGeom prst="rect">
             <a:avLst/>
@@ -11012,11 +11025,11 @@
           <a:p>
             <a:pPr algn="ctr"/>
             <a:r>
-              <a:rPr lang="en-US" sz="3000" dirty="0" smtClean="0">
-                <a:solidFill>
-                  <a:schemeClr val="bg1"/>
-                </a:solidFill>
-                <a:latin typeface="Consolas" pitchFamily="49" charset="0"/>
+              <a:rPr lang="en-US" sz="2400" dirty="0" smtClean="0">
+                <a:solidFill>
+                  <a:schemeClr val="bg1"/>
+                </a:solidFill>
+                <a:latin typeface="Lucida Console" panose="020B0609040504020204" pitchFamily="49" charset="0"/>
               </a:rPr>
               <a:t>stream1.pipe(stream2).pipe(stream1);</a:t>
             </a:r>
@@ -11349,12 +11362,27 @@
   <p:clrMapOvr>
     <a:masterClrMapping/>
   </p:clrMapOvr>
+  <p:timing>
+    <p:tnLst>
+      <p:par>
+        <p:cTn id="1" dur="indefinite" restart="never" nodeType="tmRoot"/>
+      </p:par>
+    </p:tnLst>
+  </p:timing>
 </p:sld>
 </file>
 
 <file path=ppt/slides/slide25.xml><?xml version="1.0" encoding="utf-8"?>
 <p:sld xmlns:a="http://schemas.openxmlformats.org/drawingml/2006/main" xmlns:r="http://schemas.openxmlformats.org/officeDocument/2006/relationships" xmlns:p="http://schemas.openxmlformats.org/presentationml/2006/main">
   <p:cSld>
+    <p:bg>
+      <p:bgPr>
+        <a:solidFill>
+          <a:schemeClr val="tx1"/>
+        </a:solidFill>
+        <a:effectLst/>
+      </p:bgPr>
+    </p:bg>
     <p:spTree>
       <p:nvGrpSpPr>
         <p:cNvPr id="1" name=""/>
@@ -11369,6 +11397,30 @@
           <a:chExt cx="0" cy="0"/>
         </a:xfrm>
       </p:grpSpPr>
+      <p:pic>
+        <p:nvPicPr>
+          <p:cNvPr id="6" name="Picture 5"/>
+          <p:cNvPicPr>
+            <a:picLocks noChangeAspect="1"/>
+          </p:cNvPicPr>
+          <p:nvPr/>
+        </p:nvPicPr>
+        <p:blipFill>
+          <a:blip r:embed="rId2" cstate="print"/>
+          <a:stretch>
+            <a:fillRect/>
+          </a:stretch>
+        </p:blipFill>
+        <p:spPr>
+          <a:xfrm>
+            <a:off x="10886" y="0"/>
+            <a:ext cx="2781300" cy="2257425"/>
+          </a:xfrm>
+          <a:prstGeom prst="rect">
+            <a:avLst/>
+          </a:prstGeom>
+        </p:spPr>
+      </p:pic>
       <p:sp>
         <p:nvSpPr>
           <p:cNvPr id="2" name="Title 1"/>
@@ -11381,105 +11433,292 @@
         </p:nvSpPr>
         <p:spPr/>
         <p:txBody>
-          <a:bodyPr/>
+          <a:bodyPr>
+            <a:normAutofit fontScale="90000"/>
+          </a:bodyPr>
           <a:lstStyle/>
           <a:p>
-            <a:r>
-              <a:rPr lang="en-US" dirty="0" smtClean="0"/>
-              <a:t>Complex Event Processing</a:t>
-            </a:r>
-            <a:endParaRPr lang="en-US" dirty="0"/>
-          </a:p>
-        </p:txBody>
-      </p:sp>
-      <p:sp>
-        <p:nvSpPr>
-          <p:cNvPr id="3" name="Content Placeholder 2"/>
-          <p:cNvSpPr>
-            <a:spLocks noGrp="1"/>
-          </p:cNvSpPr>
-          <p:nvPr>
-            <p:ph idx="1"/>
-          </p:nvPr>
-        </p:nvSpPr>
-        <p:spPr/>
-        <p:txBody>
-          <a:bodyPr/>
+            <a:pPr algn="r"/>
+            <a:r>
+              <a:rPr lang="en-US" dirty="0" smtClean="0">
+                <a:solidFill>
+                  <a:schemeClr val="bg1"/>
+                </a:solidFill>
+                <a:latin typeface="Proxima Nova Rg" panose="02000506030000020004" pitchFamily="2" charset="0"/>
+              </a:rPr>
+              <a:t>Distributed </a:t>
+            </a:r>
+            <a:r>
+              <a:rPr lang="en-US" dirty="0" smtClean="0">
+                <a:solidFill>
+                  <a:schemeClr val="bg1"/>
+                </a:solidFill>
+                <a:latin typeface="Proxima Nova Rg" panose="02000506030000020004" pitchFamily="2" charset="0"/>
+              </a:rPr>
+              <a:t>Streams</a:t>
+            </a:r>
+            <a:br>
+              <a:rPr lang="en-US" dirty="0" smtClean="0">
+                <a:solidFill>
+                  <a:schemeClr val="bg1"/>
+                </a:solidFill>
+                <a:latin typeface="Proxima Nova Rg" panose="02000506030000020004" pitchFamily="2" charset="0"/>
+              </a:rPr>
+            </a:br>
+            <a:r>
+              <a:rPr lang="en-US" sz="3600" dirty="0" smtClean="0">
+                <a:solidFill>
+                  <a:schemeClr val="bg1"/>
+                </a:solidFill>
+                <a:latin typeface="Proxima Nova Rg" panose="02000506030000020004" pitchFamily="2" charset="0"/>
+              </a:rPr>
+              <a:t>with Scuttlebutt</a:t>
+            </a:r>
+            <a:endParaRPr lang="en-US" sz="3600" dirty="0">
+              <a:solidFill>
+                <a:schemeClr val="bg1"/>
+              </a:solidFill>
+              <a:latin typeface="Proxima Nova Rg" panose="02000506030000020004" pitchFamily="2" charset="0"/>
+            </a:endParaRPr>
+          </a:p>
+        </p:txBody>
+      </p:sp>
+      <p:sp>
+        <p:nvSpPr>
+          <p:cNvPr id="4" name="TextBox 3"/>
+          <p:cNvSpPr txBox="1"/>
+          <p:nvPr/>
+        </p:nvSpPr>
+        <p:spPr>
+          <a:xfrm>
+            <a:off x="457200" y="1600200"/>
+            <a:ext cx="8229600" cy="4524315"/>
+          </a:xfrm>
+          <a:prstGeom prst="rect">
+            <a:avLst/>
+          </a:prstGeom>
+          <a:noFill/>
+        </p:spPr>
+        <p:txBody>
+          <a:bodyPr wrap="square" rtlCol="0">
+            <a:spAutoFit/>
+          </a:bodyPr>
           <a:lstStyle/>
           <a:p>
-            <a:endParaRPr lang="en-US"/>
-          </a:p>
-        </p:txBody>
-      </p:sp>
-    </p:spTree>
-    <p:extLst>
-      <p:ext uri="{BB962C8B-B14F-4D97-AF65-F5344CB8AC3E}">
-        <p14:creationId xmlns:p14="http://schemas.microsoft.com/office/powerpoint/2010/main" val="3328053085"/>
-      </p:ext>
-    </p:extLst>
-  </p:cSld>
-  <p:clrMapOvr>
-    <a:masterClrMapping/>
-  </p:clrMapOvr>
-</p:sld>
-</file>
-
-<file path=ppt/slides/slide26.xml><?xml version="1.0" encoding="utf-8"?>
-<p:sld xmlns:a="http://schemas.openxmlformats.org/drawingml/2006/main" xmlns:r="http://schemas.openxmlformats.org/officeDocument/2006/relationships" xmlns:p="http://schemas.openxmlformats.org/presentationml/2006/main">
-  <p:cSld>
-    <p:spTree>
-      <p:nvGrpSpPr>
-        <p:cNvPr id="1" name=""/>
-        <p:cNvGrpSpPr/>
-        <p:nvPr/>
-      </p:nvGrpSpPr>
-      <p:grpSpPr>
-        <a:xfrm>
-          <a:off x="0" y="0"/>
-          <a:ext cx="0" cy="0"/>
-          <a:chOff x="0" y="0"/>
-          <a:chExt cx="0" cy="0"/>
-        </a:xfrm>
-      </p:grpSpPr>
-      <p:sp>
-        <p:nvSpPr>
-          <p:cNvPr id="2" name="Title 1"/>
-          <p:cNvSpPr>
-            <a:spLocks noGrp="1"/>
-          </p:cNvSpPr>
-          <p:nvPr>
-            <p:ph type="title"/>
-          </p:nvPr>
-        </p:nvSpPr>
-        <p:spPr/>
-        <p:txBody>
-          <a:bodyPr/>
-          <a:lstStyle/>
-          <a:p>
-            <a:r>
-              <a:rPr lang="en-US" dirty="0" smtClean="0"/>
-              <a:t>Distributed Streams</a:t>
-            </a:r>
-            <a:endParaRPr lang="en-US" dirty="0"/>
-          </a:p>
-        </p:txBody>
-      </p:sp>
-      <p:sp>
-        <p:nvSpPr>
-          <p:cNvPr id="3" name="Content Placeholder 2"/>
-          <p:cNvSpPr>
-            <a:spLocks noGrp="1"/>
-          </p:cNvSpPr>
-          <p:nvPr>
-            <p:ph idx="1"/>
-          </p:nvPr>
-        </p:nvSpPr>
-        <p:spPr/>
-        <p:txBody>
-          <a:bodyPr/>
-          <a:lstStyle/>
-          <a:p>
-            <a:endParaRPr lang="en-US"/>
+            <a:endParaRPr lang="en-US" sz="2400" dirty="0">
+              <a:solidFill>
+                <a:schemeClr val="bg1"/>
+              </a:solidFill>
+              <a:latin typeface="Lucida Console" panose="020B0609040504020204" pitchFamily="49" charset="0"/>
+            </a:endParaRPr>
+          </a:p>
+          <a:p>
+            <a:r>
+              <a:rPr lang="en-US" sz="2400" dirty="0" err="1">
+                <a:solidFill>
+                  <a:schemeClr val="bg1"/>
+                </a:solidFill>
+                <a:latin typeface="Lucida Console" panose="020B0609040504020204" pitchFamily="49" charset="0"/>
+              </a:rPr>
+              <a:t>var</a:t>
+            </a:r>
+            <a:r>
+              <a:rPr lang="en-US" sz="2400" dirty="0">
+                <a:solidFill>
+                  <a:schemeClr val="bg1"/>
+                </a:solidFill>
+                <a:latin typeface="Lucida Console" panose="020B0609040504020204" pitchFamily="49" charset="0"/>
+              </a:rPr>
+              <a:t> Model = require('scuttlebutt/model')</a:t>
+            </a:r>
+          </a:p>
+          <a:p>
+            <a:endParaRPr lang="en-US" sz="2400" dirty="0">
+              <a:solidFill>
+                <a:schemeClr val="bg1"/>
+              </a:solidFill>
+              <a:latin typeface="Lucida Console" panose="020B0609040504020204" pitchFamily="49" charset="0"/>
+            </a:endParaRPr>
+          </a:p>
+          <a:p>
+            <a:r>
+              <a:rPr lang="en-US" sz="2400" dirty="0" err="1">
+                <a:solidFill>
+                  <a:schemeClr val="bg1"/>
+                </a:solidFill>
+                <a:latin typeface="Lucida Console" panose="020B0609040504020204" pitchFamily="49" charset="0"/>
+              </a:rPr>
+              <a:t>var</a:t>
+            </a:r>
+            <a:r>
+              <a:rPr lang="en-US" sz="2400" dirty="0">
+                <a:solidFill>
+                  <a:schemeClr val="bg1"/>
+                </a:solidFill>
+                <a:latin typeface="Lucida Console" panose="020B0609040504020204" pitchFamily="49" charset="0"/>
+              </a:rPr>
+              <a:t> a = new Model()</a:t>
+            </a:r>
+          </a:p>
+          <a:p>
+            <a:r>
+              <a:rPr lang="en-US" sz="2400" dirty="0" err="1">
+                <a:solidFill>
+                  <a:schemeClr val="bg1"/>
+                </a:solidFill>
+                <a:latin typeface="Lucida Console" panose="020B0609040504020204" pitchFamily="49" charset="0"/>
+              </a:rPr>
+              <a:t>var</a:t>
+            </a:r>
+            <a:r>
+              <a:rPr lang="en-US" sz="2400" dirty="0">
+                <a:solidFill>
+                  <a:schemeClr val="bg1"/>
+                </a:solidFill>
+                <a:latin typeface="Lucida Console" panose="020B0609040504020204" pitchFamily="49" charset="0"/>
+              </a:rPr>
+              <a:t> b = new Model()</a:t>
+            </a:r>
+          </a:p>
+          <a:p>
+            <a:endParaRPr lang="en-US" sz="2400" dirty="0">
+              <a:solidFill>
+                <a:schemeClr val="bg1"/>
+              </a:solidFill>
+              <a:latin typeface="Lucida Console" panose="020B0609040504020204" pitchFamily="49" charset="0"/>
+            </a:endParaRPr>
+          </a:p>
+          <a:p>
+            <a:r>
+              <a:rPr lang="en-US" sz="2400" dirty="0" err="1">
+                <a:solidFill>
+                  <a:schemeClr val="bg1"/>
+                </a:solidFill>
+                <a:latin typeface="Lucida Console" panose="020B0609040504020204" pitchFamily="49" charset="0"/>
+              </a:rPr>
+              <a:t>a.set</a:t>
+            </a:r>
+            <a:r>
+              <a:rPr lang="en-US" sz="2400" dirty="0">
+                <a:solidFill>
+                  <a:schemeClr val="bg1"/>
+                </a:solidFill>
+                <a:latin typeface="Lucida Console" panose="020B0609040504020204" pitchFamily="49" charset="0"/>
+              </a:rPr>
+              <a:t>(key, value)</a:t>
+            </a:r>
+          </a:p>
+          <a:p>
+            <a:endParaRPr lang="en-US" sz="2400" dirty="0">
+              <a:solidFill>
+                <a:schemeClr val="bg1"/>
+              </a:solidFill>
+              <a:latin typeface="Lucida Console" panose="020B0609040504020204" pitchFamily="49" charset="0"/>
+            </a:endParaRPr>
+          </a:p>
+          <a:p>
+            <a:r>
+              <a:rPr lang="en-US" sz="2400" dirty="0" err="1">
+                <a:solidFill>
+                  <a:schemeClr val="bg1"/>
+                </a:solidFill>
+                <a:latin typeface="Lucida Console" panose="020B0609040504020204" pitchFamily="49" charset="0"/>
+              </a:rPr>
+              <a:t>b.on</a:t>
+            </a:r>
+            <a:r>
+              <a:rPr lang="en-US" sz="2400" dirty="0">
+                <a:solidFill>
+                  <a:schemeClr val="bg1"/>
+                </a:solidFill>
+                <a:latin typeface="Lucida Console" panose="020B0609040504020204" pitchFamily="49" charset="0"/>
+              </a:rPr>
+              <a:t>('update', console.log)</a:t>
+            </a:r>
+          </a:p>
+          <a:p>
+            <a:endParaRPr lang="en-US" sz="2400" dirty="0">
+              <a:solidFill>
+                <a:schemeClr val="bg1"/>
+              </a:solidFill>
+              <a:latin typeface="Lucida Console" panose="020B0609040504020204" pitchFamily="49" charset="0"/>
+            </a:endParaRPr>
+          </a:p>
+          <a:p>
+            <a:r>
+              <a:rPr lang="en-US" sz="2400" dirty="0" err="1">
+                <a:solidFill>
+                  <a:schemeClr val="bg1"/>
+                </a:solidFill>
+                <a:latin typeface="Lucida Console" panose="020B0609040504020204" pitchFamily="49" charset="0"/>
+              </a:rPr>
+              <a:t>var</a:t>
+            </a:r>
+            <a:r>
+              <a:rPr lang="en-US" sz="2400" dirty="0">
+                <a:solidFill>
+                  <a:schemeClr val="bg1"/>
+                </a:solidFill>
+                <a:latin typeface="Lucida Console" panose="020B0609040504020204" pitchFamily="49" charset="0"/>
+              </a:rPr>
+              <a:t> s = </a:t>
+            </a:r>
+            <a:r>
+              <a:rPr lang="en-US" sz="2400" dirty="0" err="1">
+                <a:solidFill>
+                  <a:schemeClr val="bg1"/>
+                </a:solidFill>
+                <a:latin typeface="Lucida Console" panose="020B0609040504020204" pitchFamily="49" charset="0"/>
+              </a:rPr>
+              <a:t>a.createStream</a:t>
+            </a:r>
+            <a:r>
+              <a:rPr lang="en-US" sz="2400" dirty="0">
+                <a:solidFill>
+                  <a:schemeClr val="bg1"/>
+                </a:solidFill>
+                <a:latin typeface="Lucida Console" panose="020B0609040504020204" pitchFamily="49" charset="0"/>
+              </a:rPr>
+              <a:t>()</a:t>
+            </a:r>
+          </a:p>
+          <a:p>
+            <a:r>
+              <a:rPr lang="en-US" sz="2400" dirty="0" err="1">
+                <a:solidFill>
+                  <a:schemeClr val="bg1"/>
+                </a:solidFill>
+                <a:latin typeface="Lucida Console" panose="020B0609040504020204" pitchFamily="49" charset="0"/>
+              </a:rPr>
+              <a:t>s.pipe</a:t>
+            </a:r>
+            <a:r>
+              <a:rPr lang="en-US" sz="2400" dirty="0">
+                <a:solidFill>
+                  <a:schemeClr val="bg1"/>
+                </a:solidFill>
+                <a:latin typeface="Lucida Console" panose="020B0609040504020204" pitchFamily="49" charset="0"/>
+              </a:rPr>
+              <a:t>(</a:t>
+            </a:r>
+            <a:r>
+              <a:rPr lang="en-US" sz="2400" dirty="0" err="1">
+                <a:solidFill>
+                  <a:schemeClr val="bg1"/>
+                </a:solidFill>
+                <a:latin typeface="Lucida Console" panose="020B0609040504020204" pitchFamily="49" charset="0"/>
+              </a:rPr>
+              <a:t>b.createStream</a:t>
+            </a:r>
+            <a:r>
+              <a:rPr lang="en-US" sz="2400" dirty="0">
+                <a:solidFill>
+                  <a:schemeClr val="bg1"/>
+                </a:solidFill>
+                <a:latin typeface="Lucida Console" panose="020B0609040504020204" pitchFamily="49" charset="0"/>
+              </a:rPr>
+              <a:t>()).pipe(s)</a:t>
+            </a:r>
           </a:p>
         </p:txBody>
       </p:sp>
@@ -11493,10 +11732,17 @@
   <p:clrMapOvr>
     <a:masterClrMapping/>
   </p:clrMapOvr>
+  <p:timing>
+    <p:tnLst>
+      <p:par>
+        <p:cTn id="1" dur="indefinite" restart="never" nodeType="tmRoot"/>
+      </p:par>
+    </p:tnLst>
+  </p:timing>
 </p:sld>
 </file>
 
-<file path=ppt/slides/slide27.xml><?xml version="1.0" encoding="utf-8"?>
+<file path=ppt/slides/slide26.xml><?xml version="1.0" encoding="utf-8"?>
 <p:sld xmlns:a="http://schemas.openxmlformats.org/drawingml/2006/main" xmlns:r="http://schemas.openxmlformats.org/officeDocument/2006/relationships" xmlns:p="http://schemas.openxmlformats.org/presentationml/2006/main">
   <p:cSld>
     <p:bg>
@@ -11648,10 +11894,17 @@
   <p:clrMapOvr>
     <a:masterClrMapping/>
   </p:clrMapOvr>
+  <p:timing>
+    <p:tnLst>
+      <p:par>
+        <p:cTn id="1" dur="indefinite" restart="never" nodeType="tmRoot"/>
+      </p:par>
+    </p:tnLst>
+  </p:timing>
 </p:sld>
 </file>
 
-<file path=ppt/slides/slide28.xml><?xml version="1.0" encoding="utf-8"?>
+<file path=ppt/slides/slide27.xml><?xml version="1.0" encoding="utf-8"?>
 <p:sld xmlns:a="http://schemas.openxmlformats.org/drawingml/2006/main" xmlns:r="http://schemas.openxmlformats.org/officeDocument/2006/relationships" xmlns:p="http://schemas.openxmlformats.org/presentationml/2006/main">
   <p:cSld>
     <p:bg>
@@ -11976,10 +12229,17 @@
   <p:clrMapOvr>
     <a:masterClrMapping/>
   </p:clrMapOvr>
+  <p:timing>
+    <p:tnLst>
+      <p:par>
+        <p:cTn id="1" dur="indefinite" restart="never" nodeType="tmRoot"/>
+      </p:par>
+    </p:tnLst>
+  </p:timing>
 </p:sld>
 </file>
 
-<file path=ppt/slides/slide29.xml><?xml version="1.0" encoding="utf-8"?>
+<file path=ppt/slides/slide28.xml><?xml version="1.0" encoding="utf-8"?>
 <p:sld xmlns:a="http://schemas.openxmlformats.org/drawingml/2006/main" xmlns:r="http://schemas.openxmlformats.org/officeDocument/2006/relationships" xmlns:p="http://schemas.openxmlformats.org/presentationml/2006/main">
   <p:cSld>
     <p:bg>
@@ -12368,6 +12628,144 @@
     <p:extLst>
       <p:ext uri="{BB962C8B-B14F-4D97-AF65-F5344CB8AC3E}">
         <p14:creationId xmlns:p14="http://schemas.microsoft.com/office/powerpoint/2010/main" val="3655590222"/>
+      </p:ext>
+    </p:extLst>
+  </p:cSld>
+  <p:clrMapOvr>
+    <a:masterClrMapping/>
+  </p:clrMapOvr>
+</p:sld>
+</file>
+
+<file path=ppt/slides/slide29.xml><?xml version="1.0" encoding="utf-8"?>
+<p:sld xmlns:a="http://schemas.openxmlformats.org/drawingml/2006/main" xmlns:r="http://schemas.openxmlformats.org/officeDocument/2006/relationships" xmlns:p="http://schemas.openxmlformats.org/presentationml/2006/main">
+  <p:cSld>
+    <p:bg>
+      <p:bgPr>
+        <a:solidFill>
+          <a:schemeClr val="tx1"/>
+        </a:solidFill>
+        <a:effectLst/>
+      </p:bgPr>
+    </p:bg>
+    <p:spTree>
+      <p:nvGrpSpPr>
+        <p:cNvPr id="1" name=""/>
+        <p:cNvGrpSpPr/>
+        <p:nvPr/>
+      </p:nvGrpSpPr>
+      <p:grpSpPr>
+        <a:xfrm>
+          <a:off x="0" y="0"/>
+          <a:ext cx="0" cy="0"/>
+          <a:chOff x="0" y="0"/>
+          <a:chExt cx="0" cy="0"/>
+        </a:xfrm>
+      </p:grpSpPr>
+      <p:sp>
+        <p:nvSpPr>
+          <p:cNvPr id="4" name="TextBox 3"/>
+          <p:cNvSpPr txBox="1"/>
+          <p:nvPr/>
+        </p:nvSpPr>
+        <p:spPr>
+          <a:xfrm>
+            <a:off x="762000" y="2766536"/>
+            <a:ext cx="7543800" cy="738664"/>
+          </a:xfrm>
+          <a:prstGeom prst="rect">
+            <a:avLst/>
+          </a:prstGeom>
+          <a:noFill/>
+        </p:spPr>
+        <p:txBody>
+          <a:bodyPr wrap="square" rtlCol="0">
+            <a:spAutoFit/>
+          </a:bodyPr>
+          <a:lstStyle/>
+          <a:p>
+            <a:pPr algn="ctr"/>
+            <a:r>
+              <a:rPr lang="en-US" sz="4200" dirty="0" smtClean="0">
+                <a:solidFill>
+                  <a:schemeClr val="bg1"/>
+                </a:solidFill>
+                <a:latin typeface="Proxima Nova Rg" panose="02000506030000020004" pitchFamily="2" charset="0"/>
+              </a:rPr>
+              <a:t>Stream Handbook</a:t>
+            </a:r>
+            <a:endParaRPr lang="en-US" sz="4200" dirty="0">
+              <a:solidFill>
+                <a:schemeClr val="bg1"/>
+              </a:solidFill>
+              <a:latin typeface="Proxima Nova Rg" panose="02000506030000020004" pitchFamily="2" charset="0"/>
+            </a:endParaRPr>
+          </a:p>
+        </p:txBody>
+      </p:sp>
+      <p:sp>
+        <p:nvSpPr>
+          <p:cNvPr id="5" name="TextBox 4"/>
+          <p:cNvSpPr txBox="1"/>
+          <p:nvPr/>
+        </p:nvSpPr>
+        <p:spPr>
+          <a:xfrm>
+            <a:off x="762000" y="3505200"/>
+            <a:ext cx="7543800" cy="461665"/>
+          </a:xfrm>
+          <a:prstGeom prst="rect">
+            <a:avLst/>
+          </a:prstGeom>
+          <a:noFill/>
+        </p:spPr>
+        <p:txBody>
+          <a:bodyPr wrap="square" rtlCol="0">
+            <a:spAutoFit/>
+          </a:bodyPr>
+          <a:lstStyle/>
+          <a:p>
+            <a:pPr algn="ctr"/>
+            <a:r>
+              <a:rPr lang="en-US" sz="2400" u="sng" dirty="0">
+                <a:solidFill>
+                  <a:schemeClr val="bg1"/>
+                </a:solidFill>
+                <a:latin typeface="Proxima Nova Rg" panose="02000506030000020004" pitchFamily="50" charset="0"/>
+              </a:rPr>
+              <a:t>https://github.com/substack/stream-handbook</a:t>
+            </a:r>
+          </a:p>
+        </p:txBody>
+      </p:sp>
+      <p:pic>
+        <p:nvPicPr>
+          <p:cNvPr id="6" name="Picture 5"/>
+          <p:cNvPicPr>
+            <a:picLocks noChangeAspect="1"/>
+          </p:cNvPicPr>
+          <p:nvPr/>
+        </p:nvPicPr>
+        <p:blipFill>
+          <a:blip r:embed="rId2" cstate="print"/>
+          <a:stretch>
+            <a:fillRect/>
+          </a:stretch>
+        </p:blipFill>
+        <p:spPr>
+          <a:xfrm>
+            <a:off x="0" y="0"/>
+            <a:ext cx="2781300" cy="2257425"/>
+          </a:xfrm>
+          <a:prstGeom prst="rect">
+            <a:avLst/>
+          </a:prstGeom>
+        </p:spPr>
+      </p:pic>
+    </p:spTree>
+    <p:extLst>
+      <p:ext uri="{BB962C8B-B14F-4D97-AF65-F5344CB8AC3E}">
+        <p14:creationId xmlns:p14="http://schemas.microsoft.com/office/powerpoint/2010/main" val="3335521030"/>
       </p:ext>
     </p:extLst>
   </p:cSld>
@@ -12546,144 +12944,6 @@
           <a:chExt cx="0" cy="0"/>
         </a:xfrm>
       </p:grpSpPr>
-      <p:sp>
-        <p:nvSpPr>
-          <p:cNvPr id="4" name="TextBox 3"/>
-          <p:cNvSpPr txBox="1"/>
-          <p:nvPr/>
-        </p:nvSpPr>
-        <p:spPr>
-          <a:xfrm>
-            <a:off x="762000" y="2766536"/>
-            <a:ext cx="7543800" cy="738664"/>
-          </a:xfrm>
-          <a:prstGeom prst="rect">
-            <a:avLst/>
-          </a:prstGeom>
-          <a:noFill/>
-        </p:spPr>
-        <p:txBody>
-          <a:bodyPr wrap="square" rtlCol="0">
-            <a:spAutoFit/>
-          </a:bodyPr>
-          <a:lstStyle/>
-          <a:p>
-            <a:pPr algn="ctr"/>
-            <a:r>
-              <a:rPr lang="en-US" sz="4200" dirty="0" smtClean="0">
-                <a:solidFill>
-                  <a:schemeClr val="bg1"/>
-                </a:solidFill>
-                <a:latin typeface="Proxima Nova Rg" panose="02000506030000020004" pitchFamily="2" charset="0"/>
-              </a:rPr>
-              <a:t>Stream Handbook</a:t>
-            </a:r>
-            <a:endParaRPr lang="en-US" sz="4200" dirty="0">
-              <a:solidFill>
-                <a:schemeClr val="bg1"/>
-              </a:solidFill>
-              <a:latin typeface="Proxima Nova Rg" panose="02000506030000020004" pitchFamily="2" charset="0"/>
-            </a:endParaRPr>
-          </a:p>
-        </p:txBody>
-      </p:sp>
-      <p:sp>
-        <p:nvSpPr>
-          <p:cNvPr id="5" name="TextBox 4"/>
-          <p:cNvSpPr txBox="1"/>
-          <p:nvPr/>
-        </p:nvSpPr>
-        <p:spPr>
-          <a:xfrm>
-            <a:off x="762000" y="3505200"/>
-            <a:ext cx="7543800" cy="461665"/>
-          </a:xfrm>
-          <a:prstGeom prst="rect">
-            <a:avLst/>
-          </a:prstGeom>
-          <a:noFill/>
-        </p:spPr>
-        <p:txBody>
-          <a:bodyPr wrap="square" rtlCol="0">
-            <a:spAutoFit/>
-          </a:bodyPr>
-          <a:lstStyle/>
-          <a:p>
-            <a:pPr algn="ctr"/>
-            <a:r>
-              <a:rPr lang="en-US" sz="2400" u="sng" dirty="0">
-                <a:solidFill>
-                  <a:schemeClr val="bg1"/>
-                </a:solidFill>
-                <a:latin typeface="Proxima Nova Rg" panose="02000506030000020004" pitchFamily="50" charset="0"/>
-              </a:rPr>
-              <a:t>https://github.com/substack/stream-handbook</a:t>
-            </a:r>
-          </a:p>
-        </p:txBody>
-      </p:sp>
-      <p:pic>
-        <p:nvPicPr>
-          <p:cNvPr id="6" name="Picture 5"/>
-          <p:cNvPicPr>
-            <a:picLocks noChangeAspect="1"/>
-          </p:cNvPicPr>
-          <p:nvPr/>
-        </p:nvPicPr>
-        <p:blipFill>
-          <a:blip r:embed="rId2" cstate="print"/>
-          <a:stretch>
-            <a:fillRect/>
-          </a:stretch>
-        </p:blipFill>
-        <p:spPr>
-          <a:xfrm>
-            <a:off x="0" y="0"/>
-            <a:ext cx="2781300" cy="2257425"/>
-          </a:xfrm>
-          <a:prstGeom prst="rect">
-            <a:avLst/>
-          </a:prstGeom>
-        </p:spPr>
-      </p:pic>
-    </p:spTree>
-    <p:extLst>
-      <p:ext uri="{BB962C8B-B14F-4D97-AF65-F5344CB8AC3E}">
-        <p14:creationId xmlns:p14="http://schemas.microsoft.com/office/powerpoint/2010/main" val="3335521030"/>
-      </p:ext>
-    </p:extLst>
-  </p:cSld>
-  <p:clrMapOvr>
-    <a:masterClrMapping/>
-  </p:clrMapOvr>
-</p:sld>
-</file>
-
-<file path=ppt/slides/slide31.xml><?xml version="1.0" encoding="utf-8"?>
-<p:sld xmlns:a="http://schemas.openxmlformats.org/drawingml/2006/main" xmlns:r="http://schemas.openxmlformats.org/officeDocument/2006/relationships" xmlns:p="http://schemas.openxmlformats.org/presentationml/2006/main">
-  <p:cSld>
-    <p:bg>
-      <p:bgPr>
-        <a:solidFill>
-          <a:schemeClr val="tx1"/>
-        </a:solidFill>
-        <a:effectLst/>
-      </p:bgPr>
-    </p:bg>
-    <p:spTree>
-      <p:nvGrpSpPr>
-        <p:cNvPr id="1" name=""/>
-        <p:cNvGrpSpPr/>
-        <p:nvPr/>
-      </p:nvGrpSpPr>
-      <p:grpSpPr>
-        <a:xfrm>
-          <a:off x="0" y="0"/>
-          <a:ext cx="0" cy="0"/>
-          <a:chOff x="0" y="0"/>
-          <a:chExt cx="0" cy="0"/>
-        </a:xfrm>
-      </p:grpSpPr>
       <p:pic>
         <p:nvPicPr>
           <p:cNvPr id="4" name="Picture 3"/>
@@ -12858,7 +13118,7 @@
 </p:sld>
 </file>
 
-<file path=ppt/slides/slide32.xml><?xml version="1.0" encoding="utf-8"?>
+<file path=ppt/slides/slide31.xml><?xml version="1.0" encoding="utf-8"?>
 <p:sld xmlns:a="http://schemas.openxmlformats.org/drawingml/2006/main" xmlns:r="http://schemas.openxmlformats.org/officeDocument/2006/relationships" xmlns:p="http://schemas.openxmlformats.org/presentationml/2006/main">
   <p:cSld>
     <p:bg>
@@ -13168,7 +13428,7 @@
 </p:sld>
 </file>
 
-<file path=ppt/slides/slide33.xml><?xml version="1.0" encoding="utf-8"?>
+<file path=ppt/slides/slide32.xml><?xml version="1.0" encoding="utf-8"?>
 <p:sld xmlns:a="http://schemas.openxmlformats.org/drawingml/2006/main" xmlns:r="http://schemas.openxmlformats.org/officeDocument/2006/relationships" xmlns:p="http://schemas.openxmlformats.org/presentationml/2006/main">
   <p:cSld>
     <p:bg>
@@ -13347,7 +13607,7 @@
 </p:sld>
 </file>
 
-<file path=ppt/slides/slide34.xml><?xml version="1.0" encoding="utf-8"?>
+<file path=ppt/slides/slide33.xml><?xml version="1.0" encoding="utf-8"?>
 <p:sld xmlns:a="http://schemas.openxmlformats.org/drawingml/2006/main" xmlns:r="http://schemas.openxmlformats.org/officeDocument/2006/relationships" xmlns:p="http://schemas.openxmlformats.org/presentationml/2006/main">
   <p:cSld>
     <p:bg>

</xml_diff>

<commit_message>
Updating readme with more samples + DNode
</commit_message>
<xml_diff>
--- a/SDC2013.pptx
+++ b/SDC2013.pptx
@@ -15070,19 +15070,10 @@
                 </a:solidFill>
                 <a:latin typeface="Proxima Nova Rg" panose="02000506030000020004" pitchFamily="2" charset="0"/>
               </a:rPr>
-              <a:t>, shoe, pause-stream</a:t>
-            </a:r>
-            <a:r>
-              <a:rPr lang="en-US" smtClean="0">
-                <a:solidFill>
-                  <a:schemeClr val="bg1"/>
-                </a:solidFill>
-                <a:latin typeface="Proxima Nova Rg" panose="02000506030000020004" pitchFamily="2" charset="0"/>
-              </a:rPr>
-              <a:t>, </a:t>
-            </a:r>
-            <a:r>
-              <a:rPr lang="en-US" smtClean="0">
+              <a:t>, shoe, pause-stream, </a:t>
+            </a:r>
+            <a:r>
+              <a:rPr lang="en-US" dirty="0" smtClean="0">
                 <a:solidFill>
                   <a:schemeClr val="bg1"/>
                 </a:solidFill>

</xml_diff>